<commit_message>
Updated cancer cells image
</commit_message>
<xml_diff>
--- a/Presentations/board.pptx
+++ b/Presentations/board.pptx
@@ -3102,6 +3102,36 @@
       </p:grpSpPr>
       <p:pic>
         <p:nvPicPr>
+          <p:cNvPr id="247" name="Picture 246" descr="CancerCellsRand.pdf"/>
+          <p:cNvPicPr>
+            <a:picLocks noChangeAspect="1"/>
+          </p:cNvPicPr>
+          <p:nvPr/>
+        </p:nvPicPr>
+        <p:blipFill>
+          <a:blip r:embed="rId2">
+            <a:extLst>
+              <a:ext uri="{28A0092B-C50C-407E-A947-70E740481C1C}">
+                <a14:useLocalDpi xmlns:a14="http://schemas.microsoft.com/office/drawing/2010/main" val="0"/>
+              </a:ext>
+            </a:extLst>
+          </a:blip>
+          <a:stretch>
+            <a:fillRect/>
+          </a:stretch>
+        </p:blipFill>
+        <p:spPr>
+          <a:xfrm>
+            <a:off x="-46077" y="9015872"/>
+            <a:ext cx="9052560" cy="9052560"/>
+          </a:xfrm>
+          <a:prstGeom prst="rect">
+            <a:avLst/>
+          </a:prstGeom>
+        </p:spPr>
+      </p:pic>
+      <p:pic>
+        <p:nvPicPr>
           <p:cNvPr id="139" name="Picture 138" descr="GettyImages_leaf.jpg"/>
           <p:cNvPicPr>
             <a:picLocks noChangeAspect="1"/>
@@ -3109,7 +3139,7 @@
           <p:nvPr/>
         </p:nvPicPr>
         <p:blipFill rotWithShape="1">
-          <a:blip r:embed="rId2">
+          <a:blip r:embed="rId3">
             <a:extLst>
               <a:ext uri="{28A0092B-C50C-407E-A947-70E740481C1C}">
                 <a14:useLocalDpi xmlns:a14="http://schemas.microsoft.com/office/drawing/2010/main" val="0"/>
@@ -3138,7 +3168,7 @@
           <p:nvPr/>
         </p:nvPicPr>
         <p:blipFill>
-          <a:blip r:embed="rId3">
+          <a:blip r:embed="rId4">
             <a:extLst>
               <a:ext uri="{28A0092B-C50C-407E-A947-70E740481C1C}">
                 <a14:useLocalDpi xmlns:a14="http://schemas.microsoft.com/office/drawing/2010/main" val="0"/>
@@ -3226,7 +3256,7 @@
             <p:nvPr/>
           </p:nvPicPr>
           <p:blipFill>
-            <a:blip r:embed="rId4"/>
+            <a:blip r:embed="rId5"/>
             <a:stretch>
               <a:fillRect/>
             </a:stretch>
@@ -3251,7 +3281,7 @@
           <p:nvPr/>
         </p:nvPicPr>
         <p:blipFill>
-          <a:blip r:embed="rId5">
+          <a:blip r:embed="rId6">
             <a:extLst>
               <a:ext uri="{28A0092B-C50C-407E-A947-70E740481C1C}">
                 <a14:useLocalDpi xmlns:a14="http://schemas.microsoft.com/office/drawing/2010/main" val="0"/>
@@ -3421,7 +3451,7 @@
             <p:nvPr/>
           </p:nvPicPr>
           <p:blipFill rotWithShape="1">
-            <a:blip r:embed="rId6">
+            <a:blip r:embed="rId7">
               <a:extLst>
                 <a:ext uri="{28A0092B-C50C-407E-A947-70E740481C1C}">
                   <a14:useLocalDpi xmlns:a14="http://schemas.microsoft.com/office/drawing/2010/main" val="0"/>
@@ -3509,7 +3539,7 @@
             <p:nvPr/>
           </p:nvPicPr>
           <p:blipFill>
-            <a:blip r:embed="rId7">
+            <a:blip r:embed="rId8">
               <a:extLst>
                 <a:ext uri="{28A0092B-C50C-407E-A947-70E740481C1C}">
                   <a14:useLocalDpi xmlns:a14="http://schemas.microsoft.com/office/drawing/2010/main" val="0"/>
@@ -3531,36 +3561,6 @@
           </p:spPr>
         </p:pic>
       </p:grpSp>
-      <p:pic>
-        <p:nvPicPr>
-          <p:cNvPr id="154" name="Picture 153" descr="CancerCells2.pdf"/>
-          <p:cNvPicPr>
-            <a:picLocks noChangeAspect="1"/>
-          </p:cNvPicPr>
-          <p:nvPr/>
-        </p:nvPicPr>
-        <p:blipFill>
-          <a:blip r:embed="rId8">
-            <a:extLst>
-              <a:ext uri="{28A0092B-C50C-407E-A947-70E740481C1C}">
-                <a14:useLocalDpi xmlns:a14="http://schemas.microsoft.com/office/drawing/2010/main" val="0"/>
-              </a:ext>
-            </a:extLst>
-          </a:blip>
-          <a:stretch>
-            <a:fillRect/>
-          </a:stretch>
-        </p:blipFill>
-        <p:spPr>
-          <a:xfrm>
-            <a:off x="-46077" y="9015560"/>
-            <a:ext cx="9052560" cy="9052560"/>
-          </a:xfrm>
-          <a:prstGeom prst="rect">
-            <a:avLst/>
-          </a:prstGeom>
-        </p:spPr>
-      </p:pic>
       <p:grpSp>
         <p:nvGrpSpPr>
           <p:cNvPr id="155" name="Group 154"/>
@@ -3569,9 +3569,9 @@
         </p:nvGrpSpPr>
         <p:grpSpPr>
           <a:xfrm>
-            <a:off x="1244401" y="9315544"/>
+            <a:off x="648306" y="10508370"/>
             <a:ext cx="4128968" cy="1682634"/>
-            <a:chOff x="-3894493" y="9898351"/>
+            <a:chOff x="-4490588" y="11091177"/>
             <a:chExt cx="4128968" cy="1682634"/>
           </a:xfrm>
         </p:grpSpPr>
@@ -3583,7 +3583,7 @@
           </p:nvSpPr>
           <p:spPr>
             <a:xfrm>
-              <a:off x="-3894493" y="9898351"/>
+              <a:off x="-4490588" y="11091177"/>
               <a:ext cx="4128968" cy="1569660"/>
             </a:xfrm>
             <a:prstGeom prst="rect">
@@ -3668,7 +3668,7 @@
           </p:blipFill>
           <p:spPr>
             <a:xfrm>
-              <a:off x="-1110251" y="10835670"/>
+              <a:off x="-1706346" y="12028496"/>
               <a:ext cx="621096" cy="745315"/>
             </a:xfrm>
             <a:prstGeom prst="rect">
@@ -3698,7 +3698,7 @@
           </p:blipFill>
           <p:spPr>
             <a:xfrm>
-              <a:off x="-819243" y="10351349"/>
+              <a:off x="-1415338" y="11544175"/>
               <a:ext cx="539024" cy="646829"/>
             </a:xfrm>
             <a:prstGeom prst="rect">
@@ -4023,7 +4023,7 @@
                 <p:nvPr/>
               </p:nvPicPr>
               <p:blipFill>
-                <a:blip r:embed="rId4"/>
+                <a:blip r:embed="rId5"/>
                 <a:stretch>
                   <a:fillRect/>
                 </a:stretch>
@@ -4114,7 +4114,7 @@
                 <p:nvPr/>
               </p:nvPicPr>
               <p:blipFill rotWithShape="1">
-                <a:blip r:embed="rId6">
+                <a:blip r:embed="rId7">
                   <a:extLst>
                     <a:ext uri="{28A0092B-C50C-407E-A947-70E740481C1C}">
                       <a14:useLocalDpi xmlns:a14="http://schemas.microsoft.com/office/drawing/2010/main" val="0"/>
@@ -4202,7 +4202,7 @@
                 <p:nvPr/>
               </p:nvPicPr>
               <p:blipFill>
-                <a:blip r:embed="rId7">
+                <a:blip r:embed="rId8">
                   <a:extLst>
                     <a:ext uri="{28A0092B-C50C-407E-A947-70E740481C1C}">
                       <a14:useLocalDpi xmlns:a14="http://schemas.microsoft.com/office/drawing/2010/main" val="0"/>
@@ -4496,7 +4496,7 @@
               <p:nvPr/>
             </p:nvPicPr>
             <p:blipFill>
-              <a:blip r:embed="rId4"/>
+              <a:blip r:embed="rId5"/>
               <a:stretch>
                 <a:fillRect/>
               </a:stretch>
@@ -4587,7 +4587,7 @@
               <p:nvPr/>
             </p:nvPicPr>
             <p:blipFill rotWithShape="1">
-              <a:blip r:embed="rId6">
+              <a:blip r:embed="rId7">
                 <a:extLst>
                   <a:ext uri="{28A0092B-C50C-407E-A947-70E740481C1C}">
                     <a14:useLocalDpi xmlns:a14="http://schemas.microsoft.com/office/drawing/2010/main" val="0"/>
@@ -4675,7 +4675,7 @@
               <p:nvPr/>
             </p:nvPicPr>
             <p:blipFill>
-              <a:blip r:embed="rId7">
+              <a:blip r:embed="rId8">
                 <a:extLst>
                   <a:ext uri="{28A0092B-C50C-407E-A947-70E740481C1C}">
                     <a14:useLocalDpi xmlns:a14="http://schemas.microsoft.com/office/drawing/2010/main" val="0"/>
@@ -4968,7 +4968,7 @@
               <p:nvPr/>
             </p:nvPicPr>
             <p:blipFill>
-              <a:blip r:embed="rId4"/>
+              <a:blip r:embed="rId5"/>
               <a:stretch>
                 <a:fillRect/>
               </a:stretch>
@@ -5059,7 +5059,7 @@
               <p:nvPr/>
             </p:nvPicPr>
             <p:blipFill rotWithShape="1">
-              <a:blip r:embed="rId6">
+              <a:blip r:embed="rId7">
                 <a:extLst>
                   <a:ext uri="{28A0092B-C50C-407E-A947-70E740481C1C}">
                     <a14:useLocalDpi xmlns:a14="http://schemas.microsoft.com/office/drawing/2010/main" val="0"/>
@@ -5147,7 +5147,7 @@
               <p:nvPr/>
             </p:nvPicPr>
             <p:blipFill>
-              <a:blip r:embed="rId7">
+              <a:blip r:embed="rId8">
                 <a:extLst>
                   <a:ext uri="{28A0092B-C50C-407E-A947-70E740481C1C}">
                     <a14:useLocalDpi xmlns:a14="http://schemas.microsoft.com/office/drawing/2010/main" val="0"/>
@@ -5440,7 +5440,7 @@
               <p:nvPr/>
             </p:nvPicPr>
             <p:blipFill>
-              <a:blip r:embed="rId4"/>
+              <a:blip r:embed="rId5"/>
               <a:stretch>
                 <a:fillRect/>
               </a:stretch>
@@ -5531,7 +5531,7 @@
               <p:nvPr/>
             </p:nvPicPr>
             <p:blipFill rotWithShape="1">
-              <a:blip r:embed="rId6">
+              <a:blip r:embed="rId7">
                 <a:extLst>
                   <a:ext uri="{28A0092B-C50C-407E-A947-70E740481C1C}">
                     <a14:useLocalDpi xmlns:a14="http://schemas.microsoft.com/office/drawing/2010/main" val="0"/>
@@ -5619,7 +5619,7 @@
               <p:nvPr/>
             </p:nvPicPr>
             <p:blipFill>
-              <a:blip r:embed="rId7">
+              <a:blip r:embed="rId8">
                 <a:extLst>
                   <a:ext uri="{28A0092B-C50C-407E-A947-70E740481C1C}">
                     <a14:useLocalDpi xmlns:a14="http://schemas.microsoft.com/office/drawing/2010/main" val="0"/>
@@ -5912,7 +5912,7 @@
               <p:nvPr/>
             </p:nvPicPr>
             <p:blipFill>
-              <a:blip r:embed="rId4"/>
+              <a:blip r:embed="rId5"/>
               <a:stretch>
                 <a:fillRect/>
               </a:stretch>
@@ -6003,7 +6003,7 @@
               <p:nvPr/>
             </p:nvPicPr>
             <p:blipFill rotWithShape="1">
-              <a:blip r:embed="rId6">
+              <a:blip r:embed="rId7">
                 <a:extLst>
                   <a:ext uri="{28A0092B-C50C-407E-A947-70E740481C1C}">
                     <a14:useLocalDpi xmlns:a14="http://schemas.microsoft.com/office/drawing/2010/main" val="0"/>
@@ -6091,7 +6091,7 @@
               <p:nvPr/>
             </p:nvPicPr>
             <p:blipFill>
-              <a:blip r:embed="rId7">
+              <a:blip r:embed="rId8">
                 <a:extLst>
                   <a:ext uri="{28A0092B-C50C-407E-A947-70E740481C1C}">
                     <a14:useLocalDpi xmlns:a14="http://schemas.microsoft.com/office/drawing/2010/main" val="0"/>
@@ -6303,6 +6303,36 @@
           </p:pic>
         </p:grpSp>
       </p:grpSp>
+      <p:pic>
+        <p:nvPicPr>
+          <p:cNvPr id="248" name="Picture 247" descr="NeuronDendrite.pdf"/>
+          <p:cNvPicPr>
+            <a:picLocks noChangeAspect="1"/>
+          </p:cNvPicPr>
+          <p:nvPr/>
+        </p:nvPicPr>
+        <p:blipFill>
+          <a:blip r:embed="rId14">
+            <a:extLst>
+              <a:ext uri="{28A0092B-C50C-407E-A947-70E740481C1C}">
+                <a14:useLocalDpi xmlns:a14="http://schemas.microsoft.com/office/drawing/2010/main" val="0"/>
+              </a:ext>
+            </a:extLst>
+          </a:blip>
+          <a:stretch>
+            <a:fillRect/>
+          </a:stretch>
+        </p:blipFill>
+        <p:spPr>
+          <a:xfrm rot="4433504">
+            <a:off x="18316237" y="4717859"/>
+            <a:ext cx="755135" cy="327225"/>
+          </a:xfrm>
+          <a:prstGeom prst="rect">
+            <a:avLst/>
+          </a:prstGeom>
+        </p:spPr>
+      </p:pic>
     </p:spTree>
     <p:extLst>
       <p:ext uri="{BB962C8B-B14F-4D97-AF65-F5344CB8AC3E}">

</xml_diff>

<commit_message>
Added an exclamation point
</commit_message>
<xml_diff>
--- a/Presentations/board.pptx
+++ b/Presentations/board.pptx
@@ -288,7 +288,7 @@
           <a:p>
             <a:fld id="{5FE470A5-DFD1-1A4E-ACA4-EF9DA8B84F4E}" type="datetimeFigureOut">
               <a:rPr lang="en-US" smtClean="0"/>
-              <a:t>5/1/15</a:t>
+              <a:t>6/23/15</a:t>
             </a:fld>
             <a:endParaRPr lang="en-US"/>
           </a:p>
@@ -458,7 +458,7 @@
           <a:p>
             <a:fld id="{5FE470A5-DFD1-1A4E-ACA4-EF9DA8B84F4E}" type="datetimeFigureOut">
               <a:rPr lang="en-US" smtClean="0"/>
-              <a:t>5/1/15</a:t>
+              <a:t>6/23/15</a:t>
             </a:fld>
             <a:endParaRPr lang="en-US"/>
           </a:p>
@@ -638,7 +638,7 @@
           <a:p>
             <a:fld id="{5FE470A5-DFD1-1A4E-ACA4-EF9DA8B84F4E}" type="datetimeFigureOut">
               <a:rPr lang="en-US" smtClean="0"/>
-              <a:t>5/1/15</a:t>
+              <a:t>6/23/15</a:t>
             </a:fld>
             <a:endParaRPr lang="en-US"/>
           </a:p>
@@ -808,7 +808,7 @@
           <a:p>
             <a:fld id="{5FE470A5-DFD1-1A4E-ACA4-EF9DA8B84F4E}" type="datetimeFigureOut">
               <a:rPr lang="en-US" smtClean="0"/>
-              <a:t>5/1/15</a:t>
+              <a:t>6/23/15</a:t>
             </a:fld>
             <a:endParaRPr lang="en-US"/>
           </a:p>
@@ -1054,7 +1054,7 @@
           <a:p>
             <a:fld id="{5FE470A5-DFD1-1A4E-ACA4-EF9DA8B84F4E}" type="datetimeFigureOut">
               <a:rPr lang="en-US" smtClean="0"/>
-              <a:t>5/1/15</a:t>
+              <a:t>6/23/15</a:t>
             </a:fld>
             <a:endParaRPr lang="en-US"/>
           </a:p>
@@ -1342,7 +1342,7 @@
           <a:p>
             <a:fld id="{5FE470A5-DFD1-1A4E-ACA4-EF9DA8B84F4E}" type="datetimeFigureOut">
               <a:rPr lang="en-US" smtClean="0"/>
-              <a:t>5/1/15</a:t>
+              <a:t>6/23/15</a:t>
             </a:fld>
             <a:endParaRPr lang="en-US"/>
           </a:p>
@@ -1769,7 +1769,7 @@
           <a:p>
             <a:fld id="{5FE470A5-DFD1-1A4E-ACA4-EF9DA8B84F4E}" type="datetimeFigureOut">
               <a:rPr lang="en-US" smtClean="0"/>
-              <a:t>5/1/15</a:t>
+              <a:t>6/23/15</a:t>
             </a:fld>
             <a:endParaRPr lang="en-US"/>
           </a:p>
@@ -1887,7 +1887,7 @@
           <a:p>
             <a:fld id="{5FE470A5-DFD1-1A4E-ACA4-EF9DA8B84F4E}" type="datetimeFigureOut">
               <a:rPr lang="en-US" smtClean="0"/>
-              <a:t>5/1/15</a:t>
+              <a:t>6/23/15</a:t>
             </a:fld>
             <a:endParaRPr lang="en-US"/>
           </a:p>
@@ -1982,7 +1982,7 @@
           <a:p>
             <a:fld id="{5FE470A5-DFD1-1A4E-ACA4-EF9DA8B84F4E}" type="datetimeFigureOut">
               <a:rPr lang="en-US" smtClean="0"/>
-              <a:t>5/1/15</a:t>
+              <a:t>6/23/15</a:t>
             </a:fld>
             <a:endParaRPr lang="en-US"/>
           </a:p>
@@ -2259,7 +2259,7 @@
           <a:p>
             <a:fld id="{5FE470A5-DFD1-1A4E-ACA4-EF9DA8B84F4E}" type="datetimeFigureOut">
               <a:rPr lang="en-US" smtClean="0"/>
-              <a:t>5/1/15</a:t>
+              <a:t>6/23/15</a:t>
             </a:fld>
             <a:endParaRPr lang="en-US"/>
           </a:p>
@@ -2512,7 +2512,7 @@
           <a:p>
             <a:fld id="{5FE470A5-DFD1-1A4E-ACA4-EF9DA8B84F4E}" type="datetimeFigureOut">
               <a:rPr lang="en-US" smtClean="0"/>
-              <a:t>5/1/15</a:t>
+              <a:t>6/23/15</a:t>
             </a:fld>
             <a:endParaRPr lang="en-US"/>
           </a:p>
@@ -2725,7 +2725,7 @@
           <a:p>
             <a:fld id="{5FE470A5-DFD1-1A4E-ACA4-EF9DA8B84F4E}" type="datetimeFigureOut">
               <a:rPr lang="en-US" smtClean="0"/>
-              <a:t>5/1/15</a:t>
+              <a:t>6/23/15</a:t>
             </a:fld>
             <a:endParaRPr lang="en-US"/>
           </a:p>
@@ -3328,11 +3328,7 @@
             <a:pPr algn="r"/>
             <a:r>
               <a:rPr lang="en-US" sz="3200" dirty="0" smtClean="0"/>
-              <a:t>Patch d</a:t>
-            </a:r>
-            <a:r>
-              <a:rPr lang="en-US" sz="3200" dirty="0" smtClean="0"/>
-              <a:t>amaged </a:t>
+              <a:t>Patch damaged </a:t>
             </a:r>
             <a:r>
               <a:rPr lang="en-US" sz="3200" dirty="0"/>
@@ -3340,7 +3336,7 @@
             </a:r>
             <a:r>
               <a:rPr lang="en-US" sz="3200" dirty="0" smtClean="0"/>
-              <a:t>vessels</a:t>
+              <a:t>vessels!</a:t>
             </a:r>
             <a:endParaRPr lang="en-US" sz="3200" dirty="0"/>
           </a:p>
@@ -3369,8 +3365,12 @@
           <a:lstStyle/>
           <a:p>
             <a:r>
+              <a:rPr lang="en-US" sz="3200" smtClean="0"/>
+              <a:t>Reconnect </a:t>
+            </a:r>
+            <a:r>
               <a:rPr lang="en-US" sz="3200" dirty="0" smtClean="0"/>
-              <a:t>Reconnect a severed neuron</a:t>
+              <a:t>severed neuron</a:t>
             </a:r>
             <a:endParaRPr lang="en-US" sz="3200" dirty="0"/>
           </a:p>
@@ -3434,10 +3434,6 @@
             </a:p>
             <a:p>
               <a:pPr algn="ctr"/>
-              <a:r>
-                <a:rPr lang="en-US" dirty="0"/>
-                <a:t/>
-              </a:r>
               <a:endParaRPr lang="en-US" dirty="0"/>
             </a:p>
           </p:txBody>
@@ -3857,10 +3853,6 @@
             </a:p>
             <a:p>
               <a:pPr algn="ctr"/>
-              <a:r>
-                <a:rPr lang="en-US" dirty="0"/>
-                <a:t/>
-              </a:r>
               <a:endParaRPr lang="en-US" dirty="0"/>
             </a:p>
           </p:txBody>
@@ -4097,10 +4089,6 @@
                 </a:p>
                 <a:p>
                   <a:pPr algn="ctr"/>
-                  <a:r>
-                    <a:rPr lang="en-US" dirty="0"/>
-                    <a:t/>
-                  </a:r>
                   <a:endParaRPr lang="en-US" dirty="0"/>
                 </a:p>
               </p:txBody>
@@ -4374,10 +4362,6 @@
                 </a:p>
                 <a:p>
                   <a:pPr algn="ctr"/>
-                  <a:r>
-                    <a:rPr lang="en-US" dirty="0"/>
-                    <a:t/>
-                  </a:r>
                   <a:endParaRPr lang="en-US" dirty="0"/>
                 </a:p>
               </p:txBody>
@@ -4570,10 +4554,6 @@
               </a:p>
               <a:p>
                 <a:pPr algn="ctr"/>
-                <a:r>
-                  <a:rPr lang="en-US" dirty="0"/>
-                  <a:t/>
-                </a:r>
                 <a:endParaRPr lang="en-US" dirty="0"/>
               </a:p>
             </p:txBody>
@@ -4847,10 +4827,6 @@
               </a:p>
               <a:p>
                 <a:pPr algn="ctr"/>
-                <a:r>
-                  <a:rPr lang="en-US" dirty="0"/>
-                  <a:t/>
-                </a:r>
                 <a:endParaRPr lang="en-US" dirty="0"/>
               </a:p>
             </p:txBody>
@@ -5042,10 +5018,6 @@
               </a:p>
               <a:p>
                 <a:pPr algn="ctr"/>
-                <a:r>
-                  <a:rPr lang="en-US" dirty="0"/>
-                  <a:t/>
-                </a:r>
                 <a:endParaRPr lang="en-US" dirty="0"/>
               </a:p>
             </p:txBody>
@@ -5319,10 +5291,6 @@
               </a:p>
               <a:p>
                 <a:pPr algn="ctr"/>
-                <a:r>
-                  <a:rPr lang="en-US" dirty="0"/>
-                  <a:t/>
-                </a:r>
                 <a:endParaRPr lang="en-US" dirty="0"/>
               </a:p>
             </p:txBody>
@@ -5514,10 +5482,6 @@
               </a:p>
               <a:p>
                 <a:pPr algn="ctr"/>
-                <a:r>
-                  <a:rPr lang="en-US" dirty="0"/>
-                  <a:t/>
-                </a:r>
                 <a:endParaRPr lang="en-US" dirty="0"/>
               </a:p>
             </p:txBody>
@@ -5791,10 +5755,6 @@
               </a:p>
               <a:p>
                 <a:pPr algn="ctr"/>
-                <a:r>
-                  <a:rPr lang="en-US" dirty="0"/>
-                  <a:t/>
-                </a:r>
                 <a:endParaRPr lang="en-US" dirty="0"/>
               </a:p>
             </p:txBody>
@@ -5986,10 +5946,6 @@
               </a:p>
               <a:p>
                 <a:pPr algn="ctr"/>
-                <a:r>
-                  <a:rPr lang="en-US" dirty="0"/>
-                  <a:t/>
-                </a:r>
                 <a:endParaRPr lang="en-US" dirty="0"/>
               </a:p>
             </p:txBody>
@@ -6263,10 +6219,6 @@
               </a:p>
               <a:p>
                 <a:pPr algn="ctr"/>
-                <a:r>
-                  <a:rPr lang="en-US" dirty="0"/>
-                  <a:t/>
-                </a:r>
                 <a:endParaRPr lang="en-US" dirty="0"/>
               </a:p>
             </p:txBody>

</xml_diff>